<commit_message>
ep05 after show work
</commit_message>
<xml_diff>
--- a/episode5/media/slides-episode-05.pptx
+++ b/episode5/media/slides-episode-05.pptx
@@ -365,7 +365,7 @@
                 <c:formatCode>General</c:formatCode>
                 <c:ptCount val="2"/>
                 <c:pt idx="0">
-                  <c:v>11</c:v>
+                  <c:v>15</c:v>
                 </c:pt>
                 <c:pt idx="1">
                   <c:v>0</c:v>
@@ -573,10 +573,10 @@
           </c:dLbls>
           <c:val>
             <c:numRef>
-              <c:f>Data!$B$2:$B$4</c:f>
+              <c:f>Data!$B$2:$B$5</c:f>
               <c:numCache>
                 <c:formatCode>General</c:formatCode>
-                <c:ptCount val="3"/>
+                <c:ptCount val="4"/>
                 <c:pt idx="0">
                   <c:v>1</c:v>
                 </c:pt>
@@ -585,6 +585,9 @@
                 </c:pt>
                 <c:pt idx="2">
                   <c:v>2</c:v>
+                </c:pt>
+                <c:pt idx="3">
+                  <c:v>4</c:v>
                 </c:pt>
               </c:numCache>
             </c:numRef>
@@ -682,10 +685,10 @@
           </c:dLbls>
           <c:val>
             <c:numRef>
-              <c:f>Data!$C$2:$C$4</c:f>
+              <c:f>Data!$C$2:$C$5</c:f>
               <c:numCache>
                 <c:formatCode>General</c:formatCode>
-                <c:ptCount val="3"/>
+                <c:ptCount val="4"/>
                 <c:pt idx="0">
                   <c:v>24</c:v>
                 </c:pt>
@@ -694,6 +697,9 @@
                 </c:pt>
                 <c:pt idx="2">
                   <c:v>11</c:v>
+                </c:pt>
+                <c:pt idx="3">
+                  <c:v>16</c:v>
                 </c:pt>
               </c:numCache>
             </c:numRef>
@@ -791,10 +797,10 @@
           </c:dLbls>
           <c:val>
             <c:numRef>
-              <c:f>Data!$D$2:$D$4</c:f>
+              <c:f>Data!$D$2:$D$5</c:f>
               <c:numCache>
                 <c:formatCode>General</c:formatCode>
-                <c:ptCount val="3"/>
+                <c:ptCount val="4"/>
                 <c:pt idx="0">
                   <c:v>0</c:v>
                 </c:pt>
@@ -802,6 +808,9 @@
                   <c:v>0</c:v>
                 </c:pt>
                 <c:pt idx="2">
+                  <c:v>0</c:v>
+                </c:pt>
+                <c:pt idx="3">
                   <c:v>0</c:v>
                 </c:pt>
               </c:numCache>
@@ -900,10 +909,10 @@
           </c:dLbls>
           <c:val>
             <c:numRef>
-              <c:f>Data!$E$2:$E$4</c:f>
+              <c:f>Data!$E$2:$E$5</c:f>
               <c:numCache>
                 <c:formatCode>General</c:formatCode>
-                <c:ptCount val="3"/>
+                <c:ptCount val="4"/>
                 <c:pt idx="0">
                   <c:v>0</c:v>
                 </c:pt>
@@ -911,6 +920,9 @@
                   <c:v>0</c:v>
                 </c:pt>
                 <c:pt idx="2">
+                  <c:v>0</c:v>
+                </c:pt>
+                <c:pt idx="3">
                   <c:v>0</c:v>
                 </c:pt>
               </c:numCache>
@@ -1009,10 +1021,10 @@
           </c:dLbls>
           <c:val>
             <c:numRef>
-              <c:f>Data!$F$2:$F$4</c:f>
+              <c:f>Data!$F$2:$F$5</c:f>
               <c:numCache>
                 <c:formatCode>General</c:formatCode>
-                <c:ptCount val="3"/>
+                <c:ptCount val="4"/>
                 <c:pt idx="0">
                   <c:v>3</c:v>
                 </c:pt>
@@ -1020,6 +1032,9 @@
                   <c:v>3</c:v>
                 </c:pt>
                 <c:pt idx="2">
+                  <c:v>2</c:v>
+                </c:pt>
+                <c:pt idx="3">
                   <c:v>2</c:v>
                 </c:pt>
               </c:numCache>
@@ -1349,9 +1364,9 @@
           </c:dLbls>
           <c:cat>
             <c:strRef>
-              <c:f>Data!$A$2:$A$4</c:f>
+              <c:f>Data!$A$2:$A$5</c:f>
               <c:strCache>
-                <c:ptCount val="3"/>
+                <c:ptCount val="4"/>
                 <c:pt idx="0">
                   <c:v>EP 01</c:v>
                 </c:pt>
@@ -1361,15 +1376,18 @@
                 <c:pt idx="2">
                   <c:v>EP03</c:v>
                 </c:pt>
+                <c:pt idx="3">
+                  <c:v>EP04</c:v>
+                </c:pt>
               </c:strCache>
             </c:strRef>
           </c:cat>
           <c:val>
             <c:numRef>
-              <c:f>Data!$B$2:$B$4</c:f>
+              <c:f>Data!$B$2:$B$5</c:f>
               <c:numCache>
                 <c:formatCode>General</c:formatCode>
-                <c:ptCount val="3"/>
+                <c:ptCount val="4"/>
                 <c:pt idx="0">
                   <c:v>1</c:v>
                 </c:pt>
@@ -1378,6 +1396,9 @@
                 </c:pt>
                 <c:pt idx="2">
                   <c:v>2</c:v>
+                </c:pt>
+                <c:pt idx="3">
+                  <c:v>4</c:v>
                 </c:pt>
               </c:numCache>
             </c:numRef>
@@ -1481,9 +1502,9 @@
           </c:dLbls>
           <c:cat>
             <c:strRef>
-              <c:f>Data!$A$2:$A$4</c:f>
+              <c:f>Data!$A$2:$A$5</c:f>
               <c:strCache>
-                <c:ptCount val="3"/>
+                <c:ptCount val="4"/>
                 <c:pt idx="0">
                   <c:v>EP 01</c:v>
                 </c:pt>
@@ -1493,15 +1514,18 @@
                 <c:pt idx="2">
                   <c:v>EP03</c:v>
                 </c:pt>
+                <c:pt idx="3">
+                  <c:v>EP04</c:v>
+                </c:pt>
               </c:strCache>
             </c:strRef>
           </c:cat>
           <c:val>
             <c:numRef>
-              <c:f>Data!$C$2:$C$4</c:f>
+              <c:f>Data!$C$2:$C$5</c:f>
               <c:numCache>
                 <c:formatCode>General</c:formatCode>
-                <c:ptCount val="3"/>
+                <c:ptCount val="4"/>
                 <c:pt idx="0">
                   <c:v>24</c:v>
                 </c:pt>
@@ -1510,6 +1534,9 @@
                 </c:pt>
                 <c:pt idx="2">
                   <c:v>11</c:v>
+                </c:pt>
+                <c:pt idx="3">
+                  <c:v>16</c:v>
                 </c:pt>
               </c:numCache>
             </c:numRef>
@@ -1835,10 +1862,10 @@
           </c:dLbls>
           <c:val>
             <c:numRef>
-              <c:f>Data!$G$2:$G$4</c:f>
+              <c:f>Data!$G$2:$G$5</c:f>
               <c:numCache>
                 <c:formatCode>General</c:formatCode>
-                <c:ptCount val="3"/>
+                <c:ptCount val="4"/>
                 <c:pt idx="0">
                   <c:v>33</c:v>
                 </c:pt>
@@ -1847,6 +1874,9 @@
                 </c:pt>
                 <c:pt idx="2">
                   <c:v>98</c:v>
+                </c:pt>
+                <c:pt idx="3">
+                  <c:v>114</c:v>
                 </c:pt>
               </c:numCache>
             </c:numRef>
@@ -13105,7 +13135,7 @@
           <a:p>
             <a:r>
               <a:rPr lang="en-US" sz="3200" dirty="0"/>
-              <a:t>Live viewer:  1</a:t>
+              <a:t>Live viewer:  2</a:t>
             </a:r>
           </a:p>
           <a:p>
@@ -13118,14 +13148,14 @@
             <a:pPr lvl="1"/>
             <a:r>
               <a:rPr lang="en-US" sz="2800" dirty="0"/>
-              <a:t>Twitch: 11 (-22)</a:t>
+              <a:t>Twitch: 15 (+4)</a:t>
             </a:r>
           </a:p>
           <a:p>
             <a:pPr lvl="1"/>
             <a:r>
               <a:rPr lang="en-US" sz="2800" dirty="0"/>
-              <a:t>YouTube: 0 (-10)</a:t>
+              <a:t>YouTube: 1 (+1)</a:t>
             </a:r>
           </a:p>
           <a:p>
@@ -13161,7 +13191,7 @@
             <p:ph sz="half" idx="2"/>
             <p:extLst>
               <p:ext uri="{D42A27DB-BD31-4B8C-83A1-F6EECF244321}">
-                <p14:modId xmlns:p14="http://schemas.microsoft.com/office/powerpoint/2010/main" val="2218468950"/>
+                <p14:modId xmlns:p14="http://schemas.microsoft.com/office/powerpoint/2010/main" val="2118756447"/>
               </p:ext>
             </p:extLst>
           </p:nvPr>
@@ -13578,6 +13608,11 @@
           </p:cNvGraphicFramePr>
           <p:nvPr>
             <p:ph idx="1"/>
+            <p:extLst>
+              <p:ext uri="{D42A27DB-BD31-4B8C-83A1-F6EECF244321}">
+                <p14:modId xmlns:p14="http://schemas.microsoft.com/office/powerpoint/2010/main" val="3006467057"/>
+              </p:ext>
+            </p:extLst>
           </p:nvPr>
         </p:nvGraphicFramePr>
         <p:xfrm>
@@ -13817,6 +13852,11 @@
           </p:cNvGraphicFramePr>
           <p:nvPr>
             <p:ph idx="1"/>
+            <p:extLst>
+              <p:ext uri="{D42A27DB-BD31-4B8C-83A1-F6EECF244321}">
+                <p14:modId xmlns:p14="http://schemas.microsoft.com/office/powerpoint/2010/main" val="2907815700"/>
+              </p:ext>
+            </p:extLst>
           </p:nvPr>
         </p:nvGraphicFramePr>
         <p:xfrm>
@@ -14056,6 +14096,11 @@
           </p:cNvGraphicFramePr>
           <p:nvPr>
             <p:ph idx="1"/>
+            <p:extLst>
+              <p:ext uri="{D42A27DB-BD31-4B8C-83A1-F6EECF244321}">
+                <p14:modId xmlns:p14="http://schemas.microsoft.com/office/powerpoint/2010/main" val="615634970"/>
+              </p:ext>
+            </p:extLst>
           </p:nvPr>
         </p:nvGraphicFramePr>
         <p:xfrm>

</xml_diff>